<commit_message>
Actualización de la descripción del software
</commit_message>
<xml_diff>
--- a/Propuesta_solucion_automatizacion.pptx
+++ b/Propuesta_solucion_automatizacion.pptx
@@ -4398,7 +4398,9 @@
         </p:nvSpPr>
         <p:spPr/>
         <p:txBody>
-          <a:bodyPr/>
+          <a:bodyPr>
+            <a:normAutofit lnSpcReduction="10000"/>
+          </a:bodyPr>
           <a:lstStyle/>
           <a:p>
             <a:pPr marL="457200" lvl="1" indent="0" algn="just">
@@ -4417,6 +4419,24 @@
             <a:r>
               <a:rPr lang="es-CL" dirty="0"/>
               <a:t>, se realiza una Base de datos creada en SQL Server. Posteriormente se implementa una página web realizada en el Framework ASP.NET la cual ayuda a: visualizar los datos obtenidos por los sensores, dar prioridad a las ordenes a realizar en el día, identificar problemas que suceden en el proceso de producción y visualizar problemas según la orden.</a:t>
+            </a:r>
+          </a:p>
+          <a:p>
+            <a:pPr marL="457200" lvl="1" indent="0" algn="just">
+              <a:buNone/>
+            </a:pPr>
+            <a:r>
+              <a:rPr lang="es-CL" dirty="0"/>
+              <a:t>Por otra parte se tiene la base de datos del SAP para obtener los datos de los pedidos.</a:t>
+            </a:r>
+          </a:p>
+          <a:p>
+            <a:pPr marL="457200" lvl="1" indent="0" algn="just">
+              <a:buNone/>
+            </a:pPr>
+            <a:r>
+              <a:rPr lang="es-CL" dirty="0"/>
+              <a:t>Cabe destacar que tanto la página web como la base de datos en la que se registran los datos de los sensores y la base de datos del SAP se encuentra en un servidor local.</a:t>
             </a:r>
           </a:p>
           <a:p>

</xml_diff>